<commit_message>
Update 20.Reciprocating Engine Cycles.pptx
</commit_message>
<xml_diff>
--- a/20.Reciprocating Engine Cycles.pptx
+++ b/20.Reciprocating Engine Cycles.pptx
@@ -17802,7 +17802,7 @@
                 </a:solidFill>
                 <a:hlinkClick r:id="rId3"/>
               </a:rPr>
-              <a:t>Example 1</a:t>
+              <a:t>Solution</a:t>
             </a:r>
             <a:endParaRPr sz="1500" dirty="0">
               <a:solidFill>
@@ -19061,7 +19061,7 @@
                 </a:solidFill>
                 <a:hlinkClick r:id="rId4"/>
               </a:rPr>
-              <a:t>Example 2</a:t>
+              <a:t>Solution</a:t>
             </a:r>
             <a:endParaRPr sz="1500" dirty="0">
               <a:solidFill>

</xml_diff>